<commit_message>
Update Getting started with Naked Functions.pptx
</commit_message>
<xml_diff>
--- a/Documentation/Getting started with Naked Functions.pptx
+++ b/Documentation/Getting started with Naked Functions.pptx
@@ -5542,7 +5542,27 @@
           <a:p>
             <a:r>
               <a:rPr lang="en-GB" dirty="0"/>
-              <a:t>(Read The Naked Functions programming model presentation first)</a:t>
+              <a:t>(Read </a:t>
+            </a:r>
+            <a:r>
+              <a:rPr lang="en-GB" dirty="0">
+                <a:hlinkClick r:id="rId2"/>
+              </a:rPr>
+              <a:t>The Naked Functions programming </a:t>
+            </a:r>
+            <a:r>
+              <a:rPr lang="en-GB">
+                <a:hlinkClick r:id="rId2"/>
+              </a:rPr>
+              <a:t>model </a:t>
+            </a:r>
+            <a:r>
+              <a:rPr lang="en-GB"/>
+              <a:t> presentation </a:t>
+            </a:r>
+            <a:r>
+              <a:rPr lang="en-GB" dirty="0"/>
+              <a:t>first)</a:t>
             </a:r>
           </a:p>
           <a:p>

</xml_diff>